<commit_message>
add logger with mutex for each log file
</commit_message>
<xml_diff>
--- a/doc/ivyscript reference.pptx
+++ b/doc/ivyscript reference.pptx
@@ -324,7 +324,7 @@
             <a:fld id="{08B3F974-BB90-4059-9901-8147A3A63439}" type="datetimeFigureOut">
               <a:rPr lang="en-US" smtClean="0"/>
               <a:pPr/>
-              <a:t>6/17/2019</a:t>
+              <a:t>9/19/2019</a:t>
             </a:fld>
             <a:endParaRPr lang="en-US" dirty="0"/>
           </a:p>
@@ -545,7 +545,6 @@
           <a:ln>
             <a:noFill/>
           </a:ln>
-          <a:extLst/>
         </p:spPr>
         <p:txBody>
           <a:bodyPr vert="horz" wrap="square" lIns="91440" tIns="45720" rIns="91440" bIns="45720" numCol="1" anchor="t" anchorCtr="0" compatLnSpc="1">
@@ -5608,7 +5607,6 @@
               <a:headEnd/>
               <a:tailEnd/>
             </a:ln>
-            <a:extLst/>
           </p:spPr>
           <p:txBody>
             <a:bodyPr vert="horz" wrap="square" lIns="91440" tIns="45720" rIns="91440" bIns="45720" numCol="1" anchor="ctr" anchorCtr="0" compatLnSpc="1">
@@ -30469,7 +30467,7 @@
           <a:p>
             <a:r>
               <a:rPr lang="en-US" dirty="0"/>
-              <a:t>2019-06-06</a:t>
+              <a:t>2019-09-19</a:t>
             </a:r>
           </a:p>
           <a:p>
@@ -33886,44 +33884,17 @@
                   </a:schemeClr>
                 </a:solidFill>
               </a:rPr>
-              <a:t>you can </a:t>
-            </a:r>
-            <a:r>
-              <a:rPr lang="en-US" sz="1200" dirty="0">
-                <a:solidFill>
-                  <a:schemeClr val="bg1">
-                    <a:lumMod val="65000"/>
-                  </a:schemeClr>
-                </a:solidFill>
-                <a:latin typeface="Courier New" pitchFamily="49" charset="0"/>
-                <a:cs typeface="Courier New" pitchFamily="49" charset="0"/>
-              </a:rPr>
-              <a:t>log(</a:t>
-            </a:r>
-            <a:r>
-              <a:rPr lang="en-US" sz="1200" dirty="0" err="1">
-                <a:solidFill>
-                  <a:schemeClr val="bg1">
-                    <a:lumMod val="65000"/>
-                  </a:schemeClr>
-                </a:solidFill>
-                <a:latin typeface="Courier New" pitchFamily="49" charset="0"/>
-                <a:cs typeface="Courier New" pitchFamily="49" charset="0"/>
-              </a:rPr>
-              <a:t>masterlogfile</a:t>
-            </a:r>
-            <a:r>
-              <a:rPr lang="en-US" sz="1200" dirty="0">
-                <a:solidFill>
-                  <a:schemeClr val="bg1">
-                    <a:lumMod val="65000"/>
-                  </a:schemeClr>
-                </a:solidFill>
-                <a:latin typeface="Courier New" pitchFamily="49" charset="0"/>
-                <a:cs typeface="Courier New" pitchFamily="49" charset="0"/>
-              </a:rPr>
-              <a:t>(), "message\n");</a:t>
-            </a:r>
+              <a:t>ivy master log filename</a:t>
+            </a:r>
+            <a:endParaRPr lang="en-US" sz="1200" dirty="0">
+              <a:solidFill>
+                <a:schemeClr val="bg1">
+                  <a:lumMod val="65000"/>
+                </a:schemeClr>
+              </a:solidFill>
+              <a:latin typeface="Courier New" pitchFamily="49" charset="0"/>
+              <a:cs typeface="Courier New" pitchFamily="49" charset="0"/>
+            </a:endParaRPr>
           </a:p>
           <a:p>
             <a:pPr>
@@ -37471,7 +37442,7 @@
         <p:spPr>
           <a:xfrm>
             <a:off x="264160" y="967575"/>
-            <a:ext cx="8584006" cy="3906711"/>
+            <a:ext cx="8584006" cy="3520964"/>
           </a:xfrm>
         </p:spPr>
         <p:txBody>
@@ -37579,25 +37550,18 @@
           </a:p>
           <a:p>
             <a:r>
-              <a:rPr lang="en-US" sz="1600" dirty="0" err="1">
-                <a:latin typeface="Courier New" pitchFamily="49" charset="0"/>
-                <a:cs typeface="Courier New" pitchFamily="49" charset="0"/>
-              </a:rPr>
-              <a:t>int</a:t>
-            </a:r>
-            <a:r>
               <a:rPr lang="en-US" sz="1600" dirty="0">
                 <a:latin typeface="Courier New" pitchFamily="49" charset="0"/>
                 <a:cs typeface="Courier New" pitchFamily="49" charset="0"/>
               </a:rPr>
-              <a:t> log(string filename, string s)</a:t>
+              <a:t>int log(string s)</a:t>
             </a:r>
           </a:p>
           <a:p>
             <a:pPr lvl="1"/>
             <a:r>
               <a:rPr lang="en-US" sz="1600" dirty="0"/>
-              <a:t>Writes a timestamp prefix before the string, and adds terminating newline if the last line in </a:t>
+              <a:t>Writes to the ivy master log file, adding a timestamp prefix before the string, and adds terminating newline if the last line in </a:t>
             </a:r>
             <a:r>
               <a:rPr lang="en-US" sz="1600" dirty="0">
@@ -37612,75 +37576,19 @@
             </a:r>
           </a:p>
           <a:p>
-            <a:pPr lvl="1"/>
-            <a:r>
-              <a:rPr lang="en-US" sz="1600" dirty="0"/>
-              <a:t>E.g. </a:t>
+            <a:r>
+              <a:rPr lang="en-US" sz="1600" dirty="0" err="1">
+                <a:latin typeface="Courier New" pitchFamily="49" charset="0"/>
+                <a:cs typeface="Courier New" pitchFamily="49" charset="0"/>
+              </a:rPr>
+              <a:t>trace_evaluate</a:t>
             </a:r>
             <a:r>
               <a:rPr lang="en-US" sz="1600" dirty="0">
                 <a:latin typeface="Courier New" pitchFamily="49" charset="0"/>
                 <a:cs typeface="Courier New" pitchFamily="49" charset="0"/>
               </a:rPr>
-              <a:t>log(</a:t>
-            </a:r>
-            <a:r>
-              <a:rPr lang="en-US" sz="1600" dirty="0" err="1">
-                <a:latin typeface="Courier New" pitchFamily="49" charset="0"/>
-                <a:cs typeface="Courier New" pitchFamily="49" charset="0"/>
-              </a:rPr>
-              <a:t>ivy_engine_get</a:t>
-            </a:r>
-            <a:r>
-              <a:rPr lang="en-US" sz="1600" dirty="0">
-                <a:latin typeface="Courier New" pitchFamily="49" charset="0"/>
-                <a:cs typeface="Courier New" pitchFamily="49" charset="0"/>
-              </a:rPr>
-              <a:t>("</a:t>
-            </a:r>
-            <a:r>
-              <a:rPr lang="en-US" sz="1600" dirty="0" err="1">
-                <a:latin typeface="Courier New" pitchFamily="49" charset="0"/>
-                <a:cs typeface="Courier New" pitchFamily="49" charset="0"/>
-              </a:rPr>
-              <a:t>masterlogfile</a:t>
-            </a:r>
-            <a:r>
-              <a:rPr lang="en-US" sz="1600" dirty="0">
-                <a:latin typeface="Courier New" pitchFamily="49" charset="0"/>
-                <a:cs typeface="Courier New" pitchFamily="49" charset="0"/>
-              </a:rPr>
-              <a:t>"),"message");</a:t>
-            </a:r>
-          </a:p>
-          <a:p>
-            <a:r>
-              <a:rPr lang="en-US" sz="1600" dirty="0" err="1">
-                <a:latin typeface="Courier New" pitchFamily="49" charset="0"/>
-                <a:cs typeface="Courier New" pitchFamily="49" charset="0"/>
-              </a:rPr>
-              <a:t>trace_evaluate</a:t>
-            </a:r>
-            <a:r>
-              <a:rPr lang="en-US" sz="1600" dirty="0">
-                <a:latin typeface="Courier New" pitchFamily="49" charset="0"/>
-                <a:cs typeface="Courier New" pitchFamily="49" charset="0"/>
-              </a:rPr>
-              <a:t>(</a:t>
-            </a:r>
-            <a:r>
-              <a:rPr lang="en-US" sz="1600" dirty="0" err="1">
-                <a:latin typeface="Courier New" pitchFamily="49" charset="0"/>
-                <a:cs typeface="Courier New" pitchFamily="49" charset="0"/>
-              </a:rPr>
-              <a:t>int</a:t>
-            </a:r>
-            <a:r>
-              <a:rPr lang="en-US" sz="1600" dirty="0">
-                <a:latin typeface="Courier New" pitchFamily="49" charset="0"/>
-                <a:cs typeface="Courier New" pitchFamily="49" charset="0"/>
-              </a:rPr>
-              <a:t>)</a:t>
+              <a:t>(int)</a:t>
             </a:r>
           </a:p>
           <a:p>

</xml_diff>

<commit_message>
1) raw strings << >>, 2) better msg for workload parms in go statement.
</commit_message>
<xml_diff>
--- a/doc/ivyscript reference.pptx
+++ b/doc/ivyscript reference.pptx
@@ -324,7 +324,7 @@
             <a:fld id="{08B3F974-BB90-4059-9901-8147A3A63439}" type="datetimeFigureOut">
               <a:rPr lang="en-US" smtClean="0"/>
               <a:pPr/>
-              <a:t>9/19/2019</a:t>
+              <a:t>9/20/2019</a:t>
             </a:fld>
             <a:endParaRPr lang="en-US" dirty="0"/>
           </a:p>
@@ -30467,7 +30467,7 @@
           <a:p>
             <a:r>
               <a:rPr lang="en-US" dirty="0"/>
-              <a:t>2019-09-19</a:t>
+              <a:t>2019-09-20</a:t>
             </a:r>
           </a:p>
           <a:p>
@@ -40331,7 +40331,7 @@
               <a:rPr lang="en-US" sz="2000" dirty="0">
                 <a:cs typeface="Courier New" pitchFamily="49" charset="0"/>
               </a:rPr>
-              <a:t>Raw strings start and end with %%.  Use this for JSON and you won’t need to escape the double-quote characters.  </a:t>
+              <a:t>Raw strings start with &lt;&lt; and end with &gt;&gt;.  Use this for JSON and you won’t need to escape the double-quote characters.  </a:t>
             </a:r>
           </a:p>
           <a:p>
@@ -40339,18 +40339,36 @@
               <a:buNone/>
             </a:pPr>
             <a:r>
-              <a:rPr lang="en-US" sz="1800" dirty="0">
+              <a:rPr lang="en-US" sz="1800">
                 <a:cs typeface="Courier New" pitchFamily="49" charset="0"/>
               </a:rPr>
               <a:t>     </a:t>
+            </a:r>
+            <a:r>
+              <a:rPr lang="en-US" sz="1800">
+                <a:latin typeface="Courier New" panose="02070309020205020404" pitchFamily="49" charset="0"/>
+                <a:cs typeface="Courier New" panose="02070309020205020404" pitchFamily="49" charset="0"/>
+              </a:rPr>
+              <a:t>&lt;&lt; </a:t>
             </a:r>
             <a:r>
               <a:rPr lang="en-US" sz="1800" dirty="0">
                 <a:latin typeface="Courier New" panose="02070309020205020404" pitchFamily="49" charset="0"/>
                 <a:cs typeface="Courier New" panose="02070309020205020404" pitchFamily="49" charset="0"/>
               </a:rPr>
-              <a:t>%% { "port" : "1A", "LDEV" : "00:FF" } %% </a:t>
-            </a:r>
+              <a:t>{ "port" : "1A", "LDEV" : "00:FF" </a:t>
+            </a:r>
+            <a:r>
+              <a:rPr lang="en-US" sz="1800">
+                <a:latin typeface="Courier New" panose="02070309020205020404" pitchFamily="49" charset="0"/>
+                <a:cs typeface="Courier New" panose="02070309020205020404" pitchFamily="49" charset="0"/>
+              </a:rPr>
+              <a:t>} &gt;&gt; </a:t>
+            </a:r>
+            <a:endParaRPr lang="en-US" sz="1800" dirty="0">
+              <a:latin typeface="Courier New" panose="02070309020205020404" pitchFamily="49" charset="0"/>
+              <a:cs typeface="Courier New" panose="02070309020205020404" pitchFamily="49" charset="0"/>
+            </a:endParaRPr>
           </a:p>
         </p:txBody>
       </p:sp>

</xml_diff>